<commit_message>
Some minor final changes.
</commit_message>
<xml_diff>
--- a/instructions/PYTHON/pres/Speaking Assignment (Instructions).pptx
+++ b/instructions/PYTHON/pres/Speaking Assignment (Instructions).pptx
@@ -5,14 +5,15 @@
     <p:sldMasterId id="2147483780" r:id="rId1"/>
   </p:sldMasterIdLst>
   <p:notesMasterIdLst>
-    <p:notesMasterId r:id="rId7"/>
+    <p:notesMasterId r:id="rId8"/>
   </p:notesMasterIdLst>
   <p:sldIdLst>
     <p:sldId id="256" r:id="rId2"/>
     <p:sldId id="257" r:id="rId3"/>
     <p:sldId id="258" r:id="rId4"/>
-    <p:sldId id="260" r:id="rId5"/>
-    <p:sldId id="262" r:id="rId6"/>
+    <p:sldId id="263" r:id="rId5"/>
+    <p:sldId id="260" r:id="rId6"/>
+    <p:sldId id="262" r:id="rId7"/>
   </p:sldIdLst>
   <p:sldSz cx="9144000" cy="6858000" type="screen4x3"/>
   <p:notesSz cx="6858000" cy="9144000"/>
@@ -5019,11 +5020,7 @@
             </a:r>
             <a:r>
               <a:rPr lang="en-US" dirty="0" smtClean="0"/>
-              <a:t> Singh     Jimmy </a:t>
-            </a:r>
-            <a:r>
-              <a:rPr lang="en-US" dirty="0" smtClean="0"/>
-              <a:t>Zong</a:t>
+              <a:t> Singh     Jimmy Zong</a:t>
             </a:r>
           </a:p>
           <a:p>
@@ -5034,11 +5031,7 @@
             </a:pPr>
             <a:r>
               <a:rPr lang="en-US" dirty="0" smtClean="0"/>
-              <a:t>June 11, </a:t>
-            </a:r>
-            <a:r>
-              <a:rPr lang="en-US" dirty="0" smtClean="0"/>
-              <a:t>2013</a:t>
+              <a:t>June 11, 2013</a:t>
             </a:r>
             <a:endParaRPr lang="en-US" dirty="0"/>
           </a:p>
@@ -5130,7 +5123,6 @@
               <a:rPr lang="en-US" sz="3300" dirty="0" smtClean="0"/>
               <a:t>Introduction</a:t>
             </a:r>
-            <a:endParaRPr lang="en-US" sz="3300" dirty="0" smtClean="0"/>
           </a:p>
           <a:p>
             <a:pPr>
@@ -5142,7 +5134,6 @@
               <a:rPr lang="en-US" sz="3300" dirty="0" smtClean="0"/>
               <a:t>Steps (Demo)</a:t>
             </a:r>
-            <a:endParaRPr lang="en-US" sz="3300" dirty="0" smtClean="0"/>
           </a:p>
           <a:p>
             <a:pPr lvl="1">
@@ -5154,7 +5145,6 @@
               <a:rPr lang="en-US" sz="2900" dirty="0" smtClean="0"/>
               <a:t>Download Installation Package</a:t>
             </a:r>
-            <a:endParaRPr lang="en-US" sz="2900" dirty="0" smtClean="0"/>
           </a:p>
           <a:p>
             <a:pPr lvl="1">
@@ -5166,7 +5156,6 @@
               <a:rPr lang="en-US" sz="2900" dirty="0" smtClean="0"/>
               <a:t>Install Python</a:t>
             </a:r>
-            <a:endParaRPr lang="en-US" sz="2900" dirty="0" smtClean="0"/>
           </a:p>
           <a:p>
             <a:pPr lvl="1">
@@ -5176,9 +5165,23 @@
             </a:pPr>
             <a:r>
               <a:rPr lang="en-US" sz="2900" dirty="0" smtClean="0"/>
-              <a:t>Configure Python</a:t>
-            </a:r>
-            <a:endParaRPr lang="en-US" sz="2900" dirty="0" smtClean="0"/>
+              <a:t>Configure </a:t>
+            </a:r>
+            <a:r>
+              <a:rPr lang="en-US" sz="2900" dirty="0" smtClean="0"/>
+              <a:t>Python</a:t>
+            </a:r>
+          </a:p>
+          <a:p>
+            <a:pPr lvl="1">
+              <a:lnSpc>
+                <a:spcPct val="120000"/>
+              </a:lnSpc>
+            </a:pPr>
+            <a:r>
+              <a:rPr lang="en-US" sz="2900" dirty="0" smtClean="0"/>
+              <a:t>Verify Setup</a:t>
+            </a:r>
           </a:p>
           <a:p>
             <a:pPr>
@@ -5348,6 +5351,51 @@
                       </p:childTnLst>
                     </p:cTn>
                   </p:par>
+                  <p:par>
+                    <p:cTn id="11" fill="hold">
+                      <p:stCondLst>
+                        <p:cond delay="indefinite"/>
+                      </p:stCondLst>
+                      <p:childTnLst>
+                        <p:par>
+                          <p:cTn id="12" fill="hold">
+                            <p:stCondLst>
+                              <p:cond delay="0"/>
+                            </p:stCondLst>
+                            <p:childTnLst>
+                              <p:par>
+                                <p:cTn id="13" presetID="3" presetClass="emph" presetSubtype="2" fill="hold" nodeType="clickEffect">
+                                  <p:stCondLst>
+                                    <p:cond delay="0"/>
+                                  </p:stCondLst>
+                                  <p:childTnLst>
+                                    <p:animClr clrSpc="rgb" dir="cw">
+                                      <p:cBhvr override="childStyle">
+                                        <p:cTn id="14" dur="10" fill="hold"/>
+                                        <p:tgtEl>
+                                          <p:spTgt spid="3">
+                                            <p:txEl>
+                                              <p:pRg st="6" end="6"/>
+                                            </p:txEl>
+                                          </p:spTgt>
+                                        </p:tgtEl>
+                                        <p:attrNameLst>
+                                          <p:attrName>style.color</p:attrName>
+                                        </p:attrNameLst>
+                                      </p:cBhvr>
+                                      <p:to>
+                                        <a:srgbClr val="2DA2BF"/>
+                                      </p:to>
+                                    </p:animClr>
+                                  </p:childTnLst>
+                                </p:cTn>
+                              </p:par>
+                            </p:childTnLst>
+                          </p:cTn>
+                        </p:par>
+                      </p:childTnLst>
+                    </p:cTn>
+                  </p:par>
                 </p:childTnLst>
               </p:cTn>
               <p:prevCondLst>
@@ -5449,21 +5497,30 @@
         <p:spPr/>
         <p:txBody>
           <a:bodyPr>
-            <a:normAutofit/>
+            <a:normAutofit lnSpcReduction="10000"/>
           </a:bodyPr>
           <a:lstStyle/>
           <a:p>
             <a:r>
               <a:rPr lang="en-US" sz="2900" dirty="0" smtClean="0"/>
-              <a:t>Who?</a:t>
-            </a:r>
+              <a:t>Prerequisites?</a:t>
+            </a:r>
+            <a:endParaRPr lang="en-US" sz="2900" dirty="0" smtClean="0"/>
           </a:p>
           <a:p>
             <a:pPr lvl="1"/>
             <a:r>
               <a:rPr lang="en-US" sz="2400" dirty="0" smtClean="0"/>
-              <a:t>Basic browser operations; </a:t>
-            </a:r>
+              <a:t>Familiarity with web browsing</a:t>
+            </a:r>
+          </a:p>
+          <a:p>
+            <a:pPr lvl="1"/>
+            <a:r>
+              <a:rPr lang="en-US" sz="2400" dirty="0" smtClean="0"/>
+              <a:t>Familiarity with directory navigation in Windows</a:t>
+            </a:r>
+            <a:endParaRPr lang="en-US" sz="2400" dirty="0" smtClean="0"/>
           </a:p>
           <a:p>
             <a:r>
@@ -5475,8 +5532,31 @@
             <a:pPr lvl="1"/>
             <a:r>
               <a:rPr lang="en-US" sz="2400" dirty="0" smtClean="0"/>
-              <a:t>A computer running 64-bit Windows 7</a:t>
-            </a:r>
+              <a:t>A computer running 64-bit Windows </a:t>
+            </a:r>
+            <a:r>
+              <a:rPr lang="en-US" sz="2400" dirty="0" smtClean="0"/>
+              <a:t>7</a:t>
+            </a:r>
+          </a:p>
+          <a:p>
+            <a:pPr lvl="1"/>
+            <a:r>
+              <a:rPr lang="en-US" sz="2400" dirty="0" smtClean="0"/>
+              <a:t>Internet connection</a:t>
+            </a:r>
+          </a:p>
+          <a:p>
+            <a:pPr lvl="1"/>
+            <a:r>
+              <a:rPr lang="en-US" sz="2400" dirty="0" smtClean="0"/>
+              <a:t>Administrative </a:t>
+            </a:r>
+            <a:r>
+              <a:rPr lang="en-US" sz="2400" dirty="0" err="1" smtClean="0"/>
+              <a:t>previliges</a:t>
+            </a:r>
+            <a:endParaRPr lang="en-US" sz="2400" dirty="0" smtClean="0"/>
           </a:p>
           <a:p>
             <a:r>
@@ -5487,10 +5567,18 @@
           <a:p>
             <a:pPr lvl="1"/>
             <a:r>
-              <a:rPr lang="en-US" sz="2400" dirty="0" smtClean="0"/>
+              <a:rPr lang="en-US" sz="2400" b="1" dirty="0" smtClean="0">
+                <a:solidFill>
+                  <a:srgbClr val="FF0000"/>
+                </a:solidFill>
+              </a:rPr>
               <a:t>Uninstall previous versions (if any)</a:t>
             </a:r>
-            <a:endParaRPr lang="en-US" sz="2400" dirty="0"/>
+            <a:endParaRPr lang="en-US" sz="2400" b="1" dirty="0">
+              <a:solidFill>
+                <a:srgbClr val="FF0000"/>
+              </a:solidFill>
+            </a:endParaRPr>
           </a:p>
           <a:p>
             <a:r>
@@ -5501,23 +5589,30 @@
           <a:p>
             <a:pPr lvl="1"/>
             <a:r>
+              <a:rPr lang="en-US" sz="2400" b="1" dirty="0" smtClean="0"/>
+              <a:t>5 </a:t>
+            </a:r>
+            <a:r>
+              <a:rPr lang="en-US" sz="2400" b="1" dirty="0" smtClean="0"/>
+              <a:t>major steps</a:t>
+            </a:r>
+            <a:r>
               <a:rPr lang="en-US" sz="2400" dirty="0" smtClean="0"/>
-              <a:t>5 steps in 10 minutes</a:t>
-            </a:r>
-          </a:p>
-          <a:p>
-            <a:r>
-              <a:rPr lang="en-US" sz="2900" dirty="0" smtClean="0"/>
-              <a:t>Why?</a:t>
-            </a:r>
-          </a:p>
-          <a:p>
-            <a:pPr lvl="1"/>
+              <a:t> </a:t>
+            </a:r>
             <a:r>
               <a:rPr lang="en-US" sz="2400" dirty="0" smtClean="0"/>
-              <a:t>For team members running Win7 to use Python</a:t>
-            </a:r>
-            <a:endParaRPr lang="en-US" sz="2400" dirty="0" smtClean="0"/>
+              <a:t>in </a:t>
+            </a:r>
+            <a:r>
+              <a:rPr lang="en-US" sz="2400" b="1" dirty="0" smtClean="0"/>
+              <a:t>10 </a:t>
+            </a:r>
+            <a:r>
+              <a:rPr lang="en-US" sz="2400" b="1" dirty="0" smtClean="0"/>
+              <a:t>minutes</a:t>
+            </a:r>
+            <a:endParaRPr lang="en-US" sz="2400" b="1" dirty="0" smtClean="0"/>
           </a:p>
         </p:txBody>
       </p:sp>
@@ -6029,6 +6124,55 @@
                       </p:childTnLst>
                     </p:cTn>
                   </p:par>
+                  <p:par>
+                    <p:cTn id="43" fill="hold">
+                      <p:stCondLst>
+                        <p:cond delay="indefinite"/>
+                      </p:stCondLst>
+                      <p:childTnLst>
+                        <p:par>
+                          <p:cTn id="44" fill="hold">
+                            <p:stCondLst>
+                              <p:cond delay="0"/>
+                            </p:stCondLst>
+                            <p:childTnLst>
+                              <p:par>
+                                <p:cTn id="45" presetID="1" presetClass="entr" presetSubtype="0" fill="hold" nodeType="clickEffect">
+                                  <p:stCondLst>
+                                    <p:cond delay="0"/>
+                                  </p:stCondLst>
+                                  <p:childTnLst>
+                                    <p:set>
+                                      <p:cBhvr>
+                                        <p:cTn id="46" dur="1" fill="hold">
+                                          <p:stCondLst>
+                                            <p:cond delay="0"/>
+                                          </p:stCondLst>
+                                        </p:cTn>
+                                        <p:tgtEl>
+                                          <p:spTgt spid="2">
+                                            <p:txEl>
+                                              <p:pRg st="10" end="10"/>
+                                            </p:txEl>
+                                          </p:spTgt>
+                                        </p:tgtEl>
+                                        <p:attrNameLst>
+                                          <p:attrName>style.visibility</p:attrName>
+                                        </p:attrNameLst>
+                                      </p:cBhvr>
+                                      <p:to>
+                                        <p:strVal val="visible"/>
+                                      </p:to>
+                                    </p:set>
+                                  </p:childTnLst>
+                                </p:cTn>
+                              </p:par>
+                            </p:childTnLst>
+                          </p:cTn>
+                        </p:par>
+                      </p:childTnLst>
+                    </p:cTn>
+                  </p:par>
                 </p:childTnLst>
               </p:cTn>
               <p:prevCondLst>
@@ -6073,12 +6217,12 @@
       </p:grpSpPr>
       <p:sp>
         <p:nvSpPr>
-          <p:cNvPr id="2" name="Title 1"/>
-          <p:cNvSpPr>
-            <a:spLocks noGrp="1"/>
-          </p:cNvSpPr>
-          <p:nvPr>
-            <p:ph type="ctrTitle"/>
+          <p:cNvPr id="2" name="Content Placeholder 1"/>
+          <p:cNvSpPr>
+            <a:spLocks noGrp="1"/>
+          </p:cNvSpPr>
+          <p:nvPr>
+            <p:ph idx="1"/>
           </p:nvPr>
         </p:nvSpPr>
         <p:spPr/>
@@ -6086,18 +6230,37 @@
           <a:bodyPr/>
           <a:lstStyle/>
           <a:p>
-            <a:pPr algn="ctr"/>
+            <a:r>
+              <a:rPr lang="en-US" sz="2900" dirty="0" smtClean="0"/>
+              <a:t>Relevance to the Project?</a:t>
+            </a:r>
+            <a:endParaRPr lang="en-US" sz="2900" dirty="0"/>
+          </a:p>
+          <a:p>
+            <a:pPr lvl="1"/>
+            <a:r>
+              <a:rPr lang="en-US" sz="2400" dirty="0"/>
+              <a:t>For team members running Win7 to use Python</a:t>
+            </a:r>
+          </a:p>
+          <a:p>
             <a:r>
               <a:rPr lang="en-US" dirty="0" smtClean="0"/>
-              <a:t>Demo Time!</a:t>
-            </a:r>
-            <a:endParaRPr lang="en-US" dirty="0"/>
-          </a:p>
-        </p:txBody>
-      </p:sp>
-      <p:sp>
-        <p:nvSpPr>
-          <p:cNvPr id="4" name="Slide Number Placeholder 3"/>
+              <a:t>Outcome?</a:t>
+            </a:r>
+          </a:p>
+          <a:p>
+            <a:pPr lvl="1"/>
+            <a:r>
+              <a:rPr lang="en-US" dirty="0" smtClean="0"/>
+              <a:t>Be able to run Python interpreter, Python scripts and programs in Command Line.</a:t>
+            </a:r>
+          </a:p>
+        </p:txBody>
+      </p:sp>
+      <p:sp>
+        <p:nvSpPr>
+          <p:cNvPr id="3" name="Slide Number Placeholder 2"/>
           <p:cNvSpPr>
             <a:spLocks noGrp="1"/>
           </p:cNvSpPr>
@@ -6118,10 +6281,74 @@
           </a:p>
         </p:txBody>
       </p:sp>
+      <p:sp>
+        <p:nvSpPr>
+          <p:cNvPr id="4" name="Title 3"/>
+          <p:cNvSpPr>
+            <a:spLocks noGrp="1"/>
+          </p:cNvSpPr>
+          <p:nvPr>
+            <p:ph type="title"/>
+          </p:nvPr>
+        </p:nvSpPr>
+        <p:spPr/>
+        <p:txBody>
+          <a:bodyPr/>
+          <a:lstStyle/>
+          <a:p>
+            <a:r>
+              <a:rPr lang="en-US" dirty="0" smtClean="0"/>
+              <a:t>Introduction (Cont.)</a:t>
+            </a:r>
+            <a:endParaRPr lang="en-US" dirty="0"/>
+          </a:p>
+        </p:txBody>
+      </p:sp>
+      <p:pic>
+        <p:nvPicPr>
+          <p:cNvPr id="1026" name="Picture 2" descr="C:\Users\yzong\Application Data\SSH\temp\img15.png"/>
+          <p:cNvPicPr>
+            <a:picLocks noChangeAspect="1" noChangeArrowheads="1"/>
+          </p:cNvPicPr>
+          <p:nvPr/>
+        </p:nvPicPr>
+        <p:blipFill>
+          <a:blip r:embed="rId2">
+            <a:extLst>
+              <a:ext uri="{28A0092B-C50C-407E-A947-70E740481C1C}">
+                <a14:useLocalDpi xmlns:a14="http://schemas.microsoft.com/office/drawing/2010/main" val="0"/>
+              </a:ext>
+            </a:extLst>
+          </a:blip>
+          <a:srcRect/>
+          <a:stretch>
+            <a:fillRect/>
+          </a:stretch>
+        </p:blipFill>
+        <p:spPr bwMode="auto">
+          <a:xfrm>
+            <a:off x="609600" y="3746774"/>
+            <a:ext cx="8025397" cy="2196826"/>
+          </a:xfrm>
+          <a:prstGeom prst="rect">
+            <a:avLst/>
+          </a:prstGeom>
+          <a:noFill/>
+          <a:extLst>
+            <a:ext uri="{909E8E84-426E-40DD-AFC4-6F175D3DCCD1}">
+              <a14:hiddenFill xmlns:a14="http://schemas.microsoft.com/office/drawing/2010/main">
+                <a:solidFill>
+                  <a:srgbClr val="FFFFFF"/>
+                </a:solidFill>
+              </a14:hiddenFill>
+            </a:ext>
+          </a:extLst>
+        </p:spPr>
+      </p:pic>
     </p:spTree>
     <p:extLst>
       <p:ext uri="{BB962C8B-B14F-4D97-AF65-F5344CB8AC3E}">
-        <p14:creationId xmlns:p14="http://schemas.microsoft.com/office/powerpoint/2010/main" val="2114467859"/>
+        <p14:creationId xmlns:p14="http://schemas.microsoft.com/office/powerpoint/2010/main" val="223871350"/>
       </p:ext>
     </p:extLst>
   </p:cSld>
@@ -6131,7 +6358,271 @@
   <p:timing>
     <p:tnLst>
       <p:par>
-        <p:cTn id="1" dur="indefinite" restart="never" nodeType="tmRoot"/>
+        <p:cTn id="1" dur="indefinite" restart="never" nodeType="tmRoot">
+          <p:childTnLst>
+            <p:seq concurrent="1" nextAc="seek">
+              <p:cTn id="2" dur="indefinite" nodeType="mainSeq">
+                <p:childTnLst>
+                  <p:par>
+                    <p:cTn id="3" fill="hold">
+                      <p:stCondLst>
+                        <p:cond delay="indefinite"/>
+                      </p:stCondLst>
+                      <p:childTnLst>
+                        <p:par>
+                          <p:cTn id="4" fill="hold">
+                            <p:stCondLst>
+                              <p:cond delay="0"/>
+                            </p:stCondLst>
+                            <p:childTnLst>
+                              <p:par>
+                                <p:cTn id="5" presetID="1" presetClass="entr" presetSubtype="0" fill="hold" nodeType="clickEffect">
+                                  <p:stCondLst>
+                                    <p:cond delay="0"/>
+                                  </p:stCondLst>
+                                  <p:childTnLst>
+                                    <p:set>
+                                      <p:cBhvr>
+                                        <p:cTn id="6" dur="1" fill="hold">
+                                          <p:stCondLst>
+                                            <p:cond delay="0"/>
+                                          </p:stCondLst>
+                                        </p:cTn>
+                                        <p:tgtEl>
+                                          <p:spTgt spid="2">
+                                            <p:txEl>
+                                              <p:pRg st="0" end="0"/>
+                                            </p:txEl>
+                                          </p:spTgt>
+                                        </p:tgtEl>
+                                        <p:attrNameLst>
+                                          <p:attrName>style.visibility</p:attrName>
+                                        </p:attrNameLst>
+                                      </p:cBhvr>
+                                      <p:to>
+                                        <p:strVal val="visible"/>
+                                      </p:to>
+                                    </p:set>
+                                  </p:childTnLst>
+                                </p:cTn>
+                              </p:par>
+                            </p:childTnLst>
+                          </p:cTn>
+                        </p:par>
+                      </p:childTnLst>
+                    </p:cTn>
+                  </p:par>
+                  <p:par>
+                    <p:cTn id="7" fill="hold">
+                      <p:stCondLst>
+                        <p:cond delay="indefinite"/>
+                      </p:stCondLst>
+                      <p:childTnLst>
+                        <p:par>
+                          <p:cTn id="8" fill="hold">
+                            <p:stCondLst>
+                              <p:cond delay="0"/>
+                            </p:stCondLst>
+                            <p:childTnLst>
+                              <p:par>
+                                <p:cTn id="9" presetID="1" presetClass="entr" presetSubtype="0" fill="hold" nodeType="clickEffect">
+                                  <p:stCondLst>
+                                    <p:cond delay="0"/>
+                                  </p:stCondLst>
+                                  <p:childTnLst>
+                                    <p:set>
+                                      <p:cBhvr>
+                                        <p:cTn id="10" dur="1" fill="hold">
+                                          <p:stCondLst>
+                                            <p:cond delay="0"/>
+                                          </p:stCondLst>
+                                        </p:cTn>
+                                        <p:tgtEl>
+                                          <p:spTgt spid="2">
+                                            <p:txEl>
+                                              <p:pRg st="1" end="1"/>
+                                            </p:txEl>
+                                          </p:spTgt>
+                                        </p:tgtEl>
+                                        <p:attrNameLst>
+                                          <p:attrName>style.visibility</p:attrName>
+                                        </p:attrNameLst>
+                                      </p:cBhvr>
+                                      <p:to>
+                                        <p:strVal val="visible"/>
+                                      </p:to>
+                                    </p:set>
+                                  </p:childTnLst>
+                                </p:cTn>
+                              </p:par>
+                            </p:childTnLst>
+                          </p:cTn>
+                        </p:par>
+                      </p:childTnLst>
+                    </p:cTn>
+                  </p:par>
+                  <p:par>
+                    <p:cTn id="11" fill="hold">
+                      <p:stCondLst>
+                        <p:cond delay="indefinite"/>
+                      </p:stCondLst>
+                      <p:childTnLst>
+                        <p:par>
+                          <p:cTn id="12" fill="hold">
+                            <p:stCondLst>
+                              <p:cond delay="0"/>
+                            </p:stCondLst>
+                            <p:childTnLst>
+                              <p:par>
+                                <p:cTn id="13" presetID="1" presetClass="entr" presetSubtype="0" fill="hold" nodeType="clickEffect">
+                                  <p:stCondLst>
+                                    <p:cond delay="0"/>
+                                  </p:stCondLst>
+                                  <p:childTnLst>
+                                    <p:set>
+                                      <p:cBhvr>
+                                        <p:cTn id="14" dur="1" fill="hold">
+                                          <p:stCondLst>
+                                            <p:cond delay="0"/>
+                                          </p:stCondLst>
+                                        </p:cTn>
+                                        <p:tgtEl>
+                                          <p:spTgt spid="2">
+                                            <p:txEl>
+                                              <p:pRg st="2" end="2"/>
+                                            </p:txEl>
+                                          </p:spTgt>
+                                        </p:tgtEl>
+                                        <p:attrNameLst>
+                                          <p:attrName>style.visibility</p:attrName>
+                                        </p:attrNameLst>
+                                      </p:cBhvr>
+                                      <p:to>
+                                        <p:strVal val="visible"/>
+                                      </p:to>
+                                    </p:set>
+                                  </p:childTnLst>
+                                </p:cTn>
+                              </p:par>
+                            </p:childTnLst>
+                          </p:cTn>
+                        </p:par>
+                      </p:childTnLst>
+                    </p:cTn>
+                  </p:par>
+                  <p:par>
+                    <p:cTn id="15" fill="hold">
+                      <p:stCondLst>
+                        <p:cond delay="indefinite"/>
+                      </p:stCondLst>
+                      <p:childTnLst>
+                        <p:par>
+                          <p:cTn id="16" fill="hold">
+                            <p:stCondLst>
+                              <p:cond delay="0"/>
+                            </p:stCondLst>
+                            <p:childTnLst>
+                              <p:par>
+                                <p:cTn id="17" presetID="1" presetClass="entr" presetSubtype="0" fill="hold" nodeType="clickEffect">
+                                  <p:stCondLst>
+                                    <p:cond delay="0"/>
+                                  </p:stCondLst>
+                                  <p:childTnLst>
+                                    <p:set>
+                                      <p:cBhvr>
+                                        <p:cTn id="18" dur="1" fill="hold">
+                                          <p:stCondLst>
+                                            <p:cond delay="0"/>
+                                          </p:stCondLst>
+                                        </p:cTn>
+                                        <p:tgtEl>
+                                          <p:spTgt spid="2">
+                                            <p:txEl>
+                                              <p:pRg st="3" end="3"/>
+                                            </p:txEl>
+                                          </p:spTgt>
+                                        </p:tgtEl>
+                                        <p:attrNameLst>
+                                          <p:attrName>style.visibility</p:attrName>
+                                        </p:attrNameLst>
+                                      </p:cBhvr>
+                                      <p:to>
+                                        <p:strVal val="visible"/>
+                                      </p:to>
+                                    </p:set>
+                                  </p:childTnLst>
+                                </p:cTn>
+                              </p:par>
+                            </p:childTnLst>
+                          </p:cTn>
+                        </p:par>
+                      </p:childTnLst>
+                    </p:cTn>
+                  </p:par>
+                  <p:par>
+                    <p:cTn id="19" fill="hold">
+                      <p:stCondLst>
+                        <p:cond delay="indefinite"/>
+                      </p:stCondLst>
+                      <p:childTnLst>
+                        <p:par>
+                          <p:cTn id="20" fill="hold">
+                            <p:stCondLst>
+                              <p:cond delay="0"/>
+                            </p:stCondLst>
+                            <p:childTnLst>
+                              <p:par>
+                                <p:cTn id="21" presetID="1" presetClass="entr" presetSubtype="0" fill="hold" nodeType="clickEffect">
+                                  <p:stCondLst>
+                                    <p:cond delay="0"/>
+                                  </p:stCondLst>
+                                  <p:childTnLst>
+                                    <p:set>
+                                      <p:cBhvr>
+                                        <p:cTn id="22" dur="1" fill="hold">
+                                          <p:stCondLst>
+                                            <p:cond delay="0"/>
+                                          </p:stCondLst>
+                                        </p:cTn>
+                                        <p:tgtEl>
+                                          <p:spTgt spid="1026"/>
+                                        </p:tgtEl>
+                                        <p:attrNameLst>
+                                          <p:attrName>style.visibility</p:attrName>
+                                        </p:attrNameLst>
+                                      </p:cBhvr>
+                                      <p:to>
+                                        <p:strVal val="visible"/>
+                                      </p:to>
+                                    </p:set>
+                                  </p:childTnLst>
+                                </p:cTn>
+                              </p:par>
+                            </p:childTnLst>
+                          </p:cTn>
+                        </p:par>
+                      </p:childTnLst>
+                    </p:cTn>
+                  </p:par>
+                </p:childTnLst>
+              </p:cTn>
+              <p:prevCondLst>
+                <p:cond evt="onPrev" delay="0">
+                  <p:tgtEl>
+                    <p:sldTgt/>
+                  </p:tgtEl>
+                </p:cond>
+              </p:prevCondLst>
+              <p:nextCondLst>
+                <p:cond evt="onNext" delay="0">
+                  <p:tgtEl>
+                    <p:sldTgt/>
+                  </p:tgtEl>
+                </p:cond>
+              </p:nextCondLst>
+            </p:seq>
+          </p:childTnLst>
+        </p:cTn>
       </p:par>
     </p:tnLst>
   </p:timing>
@@ -6157,7 +6648,7 @@
       </p:grpSpPr>
       <p:sp>
         <p:nvSpPr>
-          <p:cNvPr id="4" name="Title 3"/>
+          <p:cNvPr id="2" name="Title 1"/>
           <p:cNvSpPr>
             <a:spLocks noGrp="1"/>
           </p:cNvSpPr>
@@ -6170,6 +6661,90 @@
           <a:bodyPr/>
           <a:lstStyle/>
           <a:p>
+            <a:pPr algn="ctr"/>
+            <a:r>
+              <a:rPr lang="en-US" dirty="0" smtClean="0"/>
+              <a:t>Demo Time!</a:t>
+            </a:r>
+            <a:endParaRPr lang="en-US" dirty="0"/>
+          </a:p>
+        </p:txBody>
+      </p:sp>
+      <p:sp>
+        <p:nvSpPr>
+          <p:cNvPr id="4" name="Slide Number Placeholder 3"/>
+          <p:cNvSpPr>
+            <a:spLocks noGrp="1"/>
+          </p:cNvSpPr>
+          <p:nvPr>
+            <p:ph type="sldNum" sz="quarter" idx="12"/>
+          </p:nvPr>
+        </p:nvSpPr>
+        <p:spPr/>
+        <p:txBody>
+          <a:bodyPr/>
+          <a:lstStyle/>
+          <a:p>
+            <a:fld id="{049BB53C-8A87-4647-B8D0-26855447823B}" type="slidenum">
+              <a:rPr lang="en-US" smtClean="0"/>
+              <a:t>5</a:t>
+            </a:fld>
+            <a:endParaRPr lang="en-US"/>
+          </a:p>
+        </p:txBody>
+      </p:sp>
+    </p:spTree>
+    <p:extLst>
+      <p:ext uri="{BB962C8B-B14F-4D97-AF65-F5344CB8AC3E}">
+        <p14:creationId xmlns:p14="http://schemas.microsoft.com/office/powerpoint/2010/main" val="2114467859"/>
+      </p:ext>
+    </p:extLst>
+  </p:cSld>
+  <p:clrMapOvr>
+    <a:masterClrMapping/>
+  </p:clrMapOvr>
+  <p:timing>
+    <p:tnLst>
+      <p:par>
+        <p:cTn id="1" dur="indefinite" restart="never" nodeType="tmRoot"/>
+      </p:par>
+    </p:tnLst>
+  </p:timing>
+</p:sld>
+</file>
+
+<file path=ppt/slides/slide6.xml><?xml version="1.0" encoding="utf-8"?>
+<p:sld xmlns:a="http://schemas.openxmlformats.org/drawingml/2006/main" xmlns:r="http://schemas.openxmlformats.org/officeDocument/2006/relationships" xmlns:p="http://schemas.openxmlformats.org/presentationml/2006/main">
+  <p:cSld>
+    <p:spTree>
+      <p:nvGrpSpPr>
+        <p:cNvPr id="1" name=""/>
+        <p:cNvGrpSpPr/>
+        <p:nvPr/>
+      </p:nvGrpSpPr>
+      <p:grpSpPr>
+        <a:xfrm>
+          <a:off x="0" y="0"/>
+          <a:ext cx="0" cy="0"/>
+          <a:chOff x="0" y="0"/>
+          <a:chExt cx="0" cy="0"/>
+        </a:xfrm>
+      </p:grpSpPr>
+      <p:sp>
+        <p:nvSpPr>
+          <p:cNvPr id="4" name="Title 3"/>
+          <p:cNvSpPr>
+            <a:spLocks noGrp="1"/>
+          </p:cNvSpPr>
+          <p:nvPr>
+            <p:ph type="ctrTitle"/>
+          </p:nvPr>
+        </p:nvSpPr>
+        <p:spPr/>
+        <p:txBody>
+          <a:bodyPr/>
+          <a:lstStyle/>
+          <a:p>
             <a:r>
               <a:rPr lang="en-US" dirty="0" smtClean="0"/>
               <a:t>Thank you!</a:t>
@@ -6218,7 +6793,7 @@
           <a:p>
             <a:fld id="{049BB53C-8A87-4647-B8D0-26855447823B}" type="slidenum">
               <a:rPr lang="en-US" smtClean="0"/>
-              <a:t>5</a:t>
+              <a:t>6</a:t>
             </a:fld>
             <a:endParaRPr lang="en-US"/>
           </a:p>

</xml_diff>